<commit_message>
began exploring police report times
</commit_message>
<xml_diff>
--- a/analysis/powerpoints/EOS-RTCC-Analysis.pptx
+++ b/analysis/powerpoints/EOS-RTCC-Analysis.pptx
@@ -13,6 +13,7 @@
     <p:sldId id="279" r:id="rId7"/>
     <p:sldId id="277" r:id="rId8"/>
     <p:sldId id="278" r:id="rId9"/>
+    <p:sldId id="281" r:id="rId10"/>
   </p:sldIdLst>
   <p:sldSz cx="12192000" cy="6858000"/>
   <p:notesSz cx="6858000" cy="9144000"/>
@@ -266,7 +267,7 @@
           <a:p>
             <a:fld id="{EED1C14C-A143-42F5-B247-D0E800131009}" type="datetimeFigureOut">
               <a:rPr lang="en-US" smtClean="0"/>
-              <a:t>11/24/2022</a:t>
+              <a:t>12/21/2022</a:t>
             </a:fld>
             <a:endParaRPr lang="en-US"/>
           </a:p>
@@ -464,7 +465,7 @@
           <a:p>
             <a:fld id="{EED1C14C-A143-42F5-B247-D0E800131009}" type="datetimeFigureOut">
               <a:rPr lang="en-US" smtClean="0"/>
-              <a:t>11/24/2022</a:t>
+              <a:t>12/21/2022</a:t>
             </a:fld>
             <a:endParaRPr lang="en-US"/>
           </a:p>
@@ -672,7 +673,7 @@
           <a:p>
             <a:fld id="{EED1C14C-A143-42F5-B247-D0E800131009}" type="datetimeFigureOut">
               <a:rPr lang="en-US" smtClean="0"/>
-              <a:t>11/24/2022</a:t>
+              <a:t>12/21/2022</a:t>
             </a:fld>
             <a:endParaRPr lang="en-US"/>
           </a:p>
@@ -870,7 +871,7 @@
           <a:p>
             <a:fld id="{EED1C14C-A143-42F5-B247-D0E800131009}" type="datetimeFigureOut">
               <a:rPr lang="en-US" smtClean="0"/>
-              <a:t>11/24/2022</a:t>
+              <a:t>12/21/2022</a:t>
             </a:fld>
             <a:endParaRPr lang="en-US"/>
           </a:p>
@@ -1145,7 +1146,7 @@
           <a:p>
             <a:fld id="{EED1C14C-A143-42F5-B247-D0E800131009}" type="datetimeFigureOut">
               <a:rPr lang="en-US" smtClean="0"/>
-              <a:t>11/24/2022</a:t>
+              <a:t>12/21/2022</a:t>
             </a:fld>
             <a:endParaRPr lang="en-US"/>
           </a:p>
@@ -1410,7 +1411,7 @@
           <a:p>
             <a:fld id="{EED1C14C-A143-42F5-B247-D0E800131009}" type="datetimeFigureOut">
               <a:rPr lang="en-US" smtClean="0"/>
-              <a:t>11/24/2022</a:t>
+              <a:t>12/21/2022</a:t>
             </a:fld>
             <a:endParaRPr lang="en-US"/>
           </a:p>
@@ -1822,7 +1823,7 @@
           <a:p>
             <a:fld id="{EED1C14C-A143-42F5-B247-D0E800131009}" type="datetimeFigureOut">
               <a:rPr lang="en-US" smtClean="0"/>
-              <a:t>11/24/2022</a:t>
+              <a:t>12/21/2022</a:t>
             </a:fld>
             <a:endParaRPr lang="en-US"/>
           </a:p>
@@ -1963,7 +1964,7 @@
           <a:p>
             <a:fld id="{EED1C14C-A143-42F5-B247-D0E800131009}" type="datetimeFigureOut">
               <a:rPr lang="en-US" smtClean="0"/>
-              <a:t>11/24/2022</a:t>
+              <a:t>12/21/2022</a:t>
             </a:fld>
             <a:endParaRPr lang="en-US"/>
           </a:p>
@@ -2076,7 +2077,7 @@
           <a:p>
             <a:fld id="{EED1C14C-A143-42F5-B247-D0E800131009}" type="datetimeFigureOut">
               <a:rPr lang="en-US" smtClean="0"/>
-              <a:t>11/24/2022</a:t>
+              <a:t>12/21/2022</a:t>
             </a:fld>
             <a:endParaRPr lang="en-US"/>
           </a:p>
@@ -2387,7 +2388,7 @@
           <a:p>
             <a:fld id="{EED1C14C-A143-42F5-B247-D0E800131009}" type="datetimeFigureOut">
               <a:rPr lang="en-US" smtClean="0"/>
-              <a:t>11/24/2022</a:t>
+              <a:t>12/21/2022</a:t>
             </a:fld>
             <a:endParaRPr lang="en-US"/>
           </a:p>
@@ -2675,7 +2676,7 @@
           <a:p>
             <a:fld id="{EED1C14C-A143-42F5-B247-D0E800131009}" type="datetimeFigureOut">
               <a:rPr lang="en-US" smtClean="0"/>
-              <a:t>11/24/2022</a:t>
+              <a:t>12/21/2022</a:t>
             </a:fld>
             <a:endParaRPr lang="en-US"/>
           </a:p>
@@ -2916,7 +2917,7 @@
           <a:p>
             <a:fld id="{EED1C14C-A143-42F5-B247-D0E800131009}" type="datetimeFigureOut">
               <a:rPr lang="en-US" smtClean="0"/>
-              <a:t>11/24/2022</a:t>
+              <a:t>12/21/2022</a:t>
             </a:fld>
             <a:endParaRPr lang="en-US"/>
           </a:p>
@@ -5072,6 +5073,225 @@
 </p:sld>
 </file>
 
+<file path=ppt/slides/slide9.xml><?xml version="1.0" encoding="utf-8"?>
+<p:sld xmlns:a="http://schemas.openxmlformats.org/drawingml/2006/main" xmlns:r="http://schemas.openxmlformats.org/officeDocument/2006/relationships" xmlns:p="http://schemas.openxmlformats.org/presentationml/2006/main">
+  <p:cSld>
+    <p:bg>
+      <p:bgPr>
+        <a:solidFill>
+          <a:schemeClr val="bg1"/>
+        </a:solidFill>
+        <a:effectLst/>
+      </p:bgPr>
+    </p:bg>
+    <p:spTree>
+      <p:nvGrpSpPr>
+        <p:cNvPr id="1" name=""/>
+        <p:cNvGrpSpPr/>
+        <p:nvPr/>
+      </p:nvGrpSpPr>
+      <p:grpSpPr>
+        <a:xfrm>
+          <a:off x="0" y="0"/>
+          <a:ext cx="0" cy="0"/>
+          <a:chOff x="0" y="0"/>
+          <a:chExt cx="0" cy="0"/>
+        </a:xfrm>
+      </p:grpSpPr>
+      <p:sp>
+        <p:nvSpPr>
+          <p:cNvPr id="38" name="Rectangle 37">
+            <a:extLst>
+              <a:ext uri="{FF2B5EF4-FFF2-40B4-BE49-F238E27FC236}">
+                <a16:creationId xmlns:a16="http://schemas.microsoft.com/office/drawing/2014/main" id="{D4D28E87-62D2-4602-B72F-5F74AA236CC3}"/>
+              </a:ext>
+              <a:ext uri="{C183D7F6-B498-43B3-948B-1728B52AA6E4}">
+                <adec:decorative xmlns:adec="http://schemas.microsoft.com/office/drawing/2017/decorative" val="1"/>
+              </a:ext>
+            </a:extLst>
+          </p:cNvPr>
+          <p:cNvSpPr>
+            <a:spLocks noGrp="1" noRot="1" noChangeAspect="1" noMove="1" noResize="1" noEditPoints="1" noAdjustHandles="1" noChangeArrowheads="1" noChangeShapeType="1" noTextEdit="1"/>
+          </p:cNvSpPr>
+          <p:nvPr>
+            <p:extLst>
+              <p:ext uri="{386F3935-93C4-4BCD-93E2-E3B085C9AB24}">
+                <p16:designElem xmlns:p16="http://schemas.microsoft.com/office/powerpoint/2015/main" val="1"/>
+              </p:ext>
+            </p:extLst>
+          </p:nvPr>
+        </p:nvSpPr>
+        <p:spPr>
+          <a:xfrm>
+            <a:off x="-1" y="0"/>
+            <a:ext cx="12192001" cy="1915064"/>
+          </a:xfrm>
+          <a:prstGeom prst="rect">
+            <a:avLst/>
+          </a:prstGeom>
+          <a:ln>
+            <a:noFill/>
+          </a:ln>
+        </p:spPr>
+        <p:style>
+          <a:lnRef idx="2">
+            <a:schemeClr val="accent1">
+              <a:shade val="50000"/>
+            </a:schemeClr>
+          </a:lnRef>
+          <a:fillRef idx="1">
+            <a:schemeClr val="accent1"/>
+          </a:fillRef>
+          <a:effectRef idx="0">
+            <a:schemeClr val="accent1"/>
+          </a:effectRef>
+          <a:fontRef idx="minor">
+            <a:schemeClr val="lt1"/>
+          </a:fontRef>
+        </p:style>
+        <p:txBody>
+          <a:bodyPr rtlCol="0" anchor="ctr"/>
+          <a:lstStyle/>
+          <a:p>
+            <a:pPr algn="ctr"/>
+            <a:endParaRPr lang="en-US" dirty="0"/>
+          </a:p>
+        </p:txBody>
+      </p:sp>
+      <p:sp>
+        <p:nvSpPr>
+          <p:cNvPr id="2" name="Title 1">
+            <a:extLst>
+              <a:ext uri="{FF2B5EF4-FFF2-40B4-BE49-F238E27FC236}">
+                <a16:creationId xmlns:a16="http://schemas.microsoft.com/office/drawing/2014/main" id="{794CA3EB-7882-2C24-1555-BFA6FDDFBA33}"/>
+              </a:ext>
+            </a:extLst>
+          </p:cNvPr>
+          <p:cNvSpPr>
+            <a:spLocks noGrp="1"/>
+          </p:cNvSpPr>
+          <p:nvPr>
+            <p:ph type="title"/>
+          </p:nvPr>
+        </p:nvSpPr>
+        <p:spPr>
+          <a:xfrm>
+            <a:off x="838199" y="291090"/>
+            <a:ext cx="10515599" cy="932688"/>
+          </a:xfrm>
+        </p:spPr>
+        <p:txBody>
+          <a:bodyPr vert="horz" lIns="91440" tIns="45720" rIns="91440" bIns="45720" rtlCol="0" anchor="b">
+            <a:normAutofit/>
+          </a:bodyPr>
+          <a:lstStyle/>
+          <a:p>
+            <a:pPr algn="ctr"/>
+            <a:r>
+              <a:rPr lang="en-US" sz="5400" dirty="0">
+                <a:solidFill>
+                  <a:schemeClr val="bg1"/>
+                </a:solidFill>
+                <a:ea typeface="+mj-ea"/>
+                <a:cs typeface="+mj-cs"/>
+              </a:rPr>
+              <a:t>Police Report Data</a:t>
+            </a:r>
+            <a:endParaRPr lang="en-US" dirty="0">
+              <a:solidFill>
+                <a:schemeClr val="bg1"/>
+              </a:solidFill>
+              <a:ea typeface="+mj-ea"/>
+              <a:cs typeface="+mj-cs"/>
+            </a:endParaRPr>
+          </a:p>
+        </p:txBody>
+      </p:sp>
+      <p:pic>
+        <p:nvPicPr>
+          <p:cNvPr id="4" name="Picture 3" descr="Chart, bar chart&#10;&#10;Description automatically generated">
+            <a:extLst>
+              <a:ext uri="{FF2B5EF4-FFF2-40B4-BE49-F238E27FC236}">
+                <a16:creationId xmlns:a16="http://schemas.microsoft.com/office/drawing/2014/main" id="{07B7D3F5-86C2-F66A-399D-6C7D6EB5E461}"/>
+              </a:ext>
+            </a:extLst>
+          </p:cNvPr>
+          <p:cNvPicPr>
+            <a:picLocks noChangeAspect="1"/>
+          </p:cNvPicPr>
+          <p:nvPr/>
+        </p:nvPicPr>
+        <p:blipFill>
+          <a:blip r:embed="rId2">
+            <a:extLst>
+              <a:ext uri="{28A0092B-C50C-407E-A947-70E740481C1C}">
+                <a14:useLocalDpi xmlns:a14="http://schemas.microsoft.com/office/drawing/2010/main" val="0"/>
+              </a:ext>
+            </a:extLst>
+          </a:blip>
+          <a:stretch>
+            <a:fillRect/>
+          </a:stretch>
+        </p:blipFill>
+        <p:spPr>
+          <a:xfrm>
+            <a:off x="87314" y="1915064"/>
+            <a:ext cx="11841479" cy="1915064"/>
+          </a:xfrm>
+          <a:prstGeom prst="rect">
+            <a:avLst/>
+          </a:prstGeom>
+        </p:spPr>
+      </p:pic>
+      <p:pic>
+        <p:nvPicPr>
+          <p:cNvPr id="7" name="Picture 6" descr="Chart, bar chart&#10;&#10;Description automatically generated">
+            <a:extLst>
+              <a:ext uri="{FF2B5EF4-FFF2-40B4-BE49-F238E27FC236}">
+                <a16:creationId xmlns:a16="http://schemas.microsoft.com/office/drawing/2014/main" id="{77A844D3-CC2D-C8B1-005B-7C5176D5F3EF}"/>
+              </a:ext>
+            </a:extLst>
+          </p:cNvPr>
+          <p:cNvPicPr>
+            <a:picLocks noChangeAspect="1"/>
+          </p:cNvPicPr>
+          <p:nvPr/>
+        </p:nvPicPr>
+        <p:blipFill>
+          <a:blip r:embed="rId3">
+            <a:extLst>
+              <a:ext uri="{28A0092B-C50C-407E-A947-70E740481C1C}">
+                <a14:useLocalDpi xmlns:a14="http://schemas.microsoft.com/office/drawing/2010/main" val="0"/>
+              </a:ext>
+            </a:extLst>
+          </a:blip>
+          <a:stretch>
+            <a:fillRect/>
+          </a:stretch>
+        </p:blipFill>
+        <p:spPr>
+          <a:xfrm>
+            <a:off x="442076" y="4257666"/>
+            <a:ext cx="11307848" cy="2309244"/>
+          </a:xfrm>
+          <a:prstGeom prst="rect">
+            <a:avLst/>
+          </a:prstGeom>
+        </p:spPr>
+      </p:pic>
+    </p:spTree>
+    <p:extLst>
+      <p:ext uri="{BB962C8B-B14F-4D97-AF65-F5344CB8AC3E}">
+        <p14:creationId xmlns:p14="http://schemas.microsoft.com/office/powerpoint/2010/main" val="2811898665"/>
+      </p:ext>
+    </p:extLst>
+  </p:cSld>
+  <p:clrMapOvr>
+    <a:masterClrMapping/>
+  </p:clrMapOvr>
+</p:sld>
+</file>
+
 <file path=ppt/theme/theme1.xml><?xml version="1.0" encoding="utf-8"?>
 <a:theme xmlns:a="http://schemas.openxmlformats.org/drawingml/2006/main" name="Office Theme">
   <a:themeElements>

</xml_diff>

<commit_message>
analyzed requests by location and time of day
</commit_message>
<xml_diff>
--- a/analysis/powerpoints/EOS-RTCC-Analysis.pptx
+++ b/analysis/powerpoints/EOS-RTCC-Analysis.pptx
@@ -12,8 +12,8 @@
     <p:sldId id="276" r:id="rId6"/>
     <p:sldId id="279" r:id="rId7"/>
     <p:sldId id="277" r:id="rId8"/>
-    <p:sldId id="278" r:id="rId9"/>
-    <p:sldId id="281" r:id="rId10"/>
+    <p:sldId id="281" r:id="rId9"/>
+    <p:sldId id="282" r:id="rId10"/>
   </p:sldIdLst>
   <p:sldSz cx="12192000" cy="6858000"/>
   <p:notesSz cx="6858000" cy="9144000"/>
@@ -267,7 +267,7 @@
           <a:p>
             <a:fld id="{EED1C14C-A143-42F5-B247-D0E800131009}" type="datetimeFigureOut">
               <a:rPr lang="en-US" smtClean="0"/>
-              <a:t>12/21/2022</a:t>
+              <a:t>12/28/2022</a:t>
             </a:fld>
             <a:endParaRPr lang="en-US"/>
           </a:p>
@@ -465,7 +465,7 @@
           <a:p>
             <a:fld id="{EED1C14C-A143-42F5-B247-D0E800131009}" type="datetimeFigureOut">
               <a:rPr lang="en-US" smtClean="0"/>
-              <a:t>12/21/2022</a:t>
+              <a:t>12/28/2022</a:t>
             </a:fld>
             <a:endParaRPr lang="en-US"/>
           </a:p>
@@ -673,7 +673,7 @@
           <a:p>
             <a:fld id="{EED1C14C-A143-42F5-B247-D0E800131009}" type="datetimeFigureOut">
               <a:rPr lang="en-US" smtClean="0"/>
-              <a:t>12/21/2022</a:t>
+              <a:t>12/28/2022</a:t>
             </a:fld>
             <a:endParaRPr lang="en-US"/>
           </a:p>
@@ -871,7 +871,7 @@
           <a:p>
             <a:fld id="{EED1C14C-A143-42F5-B247-D0E800131009}" type="datetimeFigureOut">
               <a:rPr lang="en-US" smtClean="0"/>
-              <a:t>12/21/2022</a:t>
+              <a:t>12/28/2022</a:t>
             </a:fld>
             <a:endParaRPr lang="en-US"/>
           </a:p>
@@ -1146,7 +1146,7 @@
           <a:p>
             <a:fld id="{EED1C14C-A143-42F5-B247-D0E800131009}" type="datetimeFigureOut">
               <a:rPr lang="en-US" smtClean="0"/>
-              <a:t>12/21/2022</a:t>
+              <a:t>12/28/2022</a:t>
             </a:fld>
             <a:endParaRPr lang="en-US"/>
           </a:p>
@@ -1411,7 +1411,7 @@
           <a:p>
             <a:fld id="{EED1C14C-A143-42F5-B247-D0E800131009}" type="datetimeFigureOut">
               <a:rPr lang="en-US" smtClean="0"/>
-              <a:t>12/21/2022</a:t>
+              <a:t>12/28/2022</a:t>
             </a:fld>
             <a:endParaRPr lang="en-US"/>
           </a:p>
@@ -1823,7 +1823,7 @@
           <a:p>
             <a:fld id="{EED1C14C-A143-42F5-B247-D0E800131009}" type="datetimeFigureOut">
               <a:rPr lang="en-US" smtClean="0"/>
-              <a:t>12/21/2022</a:t>
+              <a:t>12/28/2022</a:t>
             </a:fld>
             <a:endParaRPr lang="en-US"/>
           </a:p>
@@ -1964,7 +1964,7 @@
           <a:p>
             <a:fld id="{EED1C14C-A143-42F5-B247-D0E800131009}" type="datetimeFigureOut">
               <a:rPr lang="en-US" smtClean="0"/>
-              <a:t>12/21/2022</a:t>
+              <a:t>12/28/2022</a:t>
             </a:fld>
             <a:endParaRPr lang="en-US"/>
           </a:p>
@@ -2077,7 +2077,7 @@
           <a:p>
             <a:fld id="{EED1C14C-A143-42F5-B247-D0E800131009}" type="datetimeFigureOut">
               <a:rPr lang="en-US" smtClean="0"/>
-              <a:t>12/21/2022</a:t>
+              <a:t>12/28/2022</a:t>
             </a:fld>
             <a:endParaRPr lang="en-US"/>
           </a:p>
@@ -2388,7 +2388,7 @@
           <a:p>
             <a:fld id="{EED1C14C-A143-42F5-B247-D0E800131009}" type="datetimeFigureOut">
               <a:rPr lang="en-US" smtClean="0"/>
-              <a:t>12/21/2022</a:t>
+              <a:t>12/28/2022</a:t>
             </a:fld>
             <a:endParaRPr lang="en-US"/>
           </a:p>
@@ -2676,7 +2676,7 @@
           <a:p>
             <a:fld id="{EED1C14C-A143-42F5-B247-D0E800131009}" type="datetimeFigureOut">
               <a:rPr lang="en-US" smtClean="0"/>
-              <a:t>12/21/2022</a:t>
+              <a:t>12/28/2022</a:t>
             </a:fld>
             <a:endParaRPr lang="en-US"/>
           </a:p>
@@ -2917,7 +2917,7 @@
           <a:p>
             <a:fld id="{EED1C14C-A143-42F5-B247-D0E800131009}" type="datetimeFigureOut">
               <a:rPr lang="en-US" smtClean="0"/>
-              <a:t>12/21/2022</a:t>
+              <a:t>12/28/2022</a:t>
             </a:fld>
             <a:endParaRPr lang="en-US"/>
           </a:p>
@@ -4975,8 +4975,10 @@
                 <a:solidFill>
                   <a:schemeClr val="bg1"/>
                 </a:solidFill>
+                <a:ea typeface="+mj-ea"/>
+                <a:cs typeface="+mj-cs"/>
               </a:rPr>
-              <a:t>Stop and Search Data</a:t>
+              <a:t>Police Report Data</a:t>
             </a:r>
             <a:endParaRPr lang="en-US" dirty="0">
               <a:solidFill>
@@ -4990,10 +4992,10 @@
       </p:sp>
       <p:pic>
         <p:nvPicPr>
-          <p:cNvPr id="4" name="slide2" descr="Sheet 1">
-            <a:extLst>
-              <a:ext uri="{FF2B5EF4-FFF2-40B4-BE49-F238E27FC236}">
-                <a16:creationId xmlns:a16="http://schemas.microsoft.com/office/drawing/2014/main" id="{E6098C35-F828-1CA2-FEBD-56A72543E9FB}"/>
+          <p:cNvPr id="4" name="Picture 3" descr="Chart, bar chart&#10;&#10;Description automatically generated">
+            <a:extLst>
+              <a:ext uri="{FF2B5EF4-FFF2-40B4-BE49-F238E27FC236}">
+                <a16:creationId xmlns:a16="http://schemas.microsoft.com/office/drawing/2014/main" id="{07B7D3F5-86C2-F66A-399D-6C7D6EB5E461}"/>
               </a:ext>
             </a:extLst>
           </p:cNvPr>
@@ -5016,8 +5018,8 @@
         </p:blipFill>
         <p:spPr>
           <a:xfrm>
-            <a:off x="117985" y="2111267"/>
-            <a:ext cx="11956026" cy="1970773"/>
+            <a:off x="87314" y="1915064"/>
+            <a:ext cx="11841479" cy="1915064"/>
           </a:xfrm>
           <a:prstGeom prst="rect">
             <a:avLst/>
@@ -5026,10 +5028,10 @@
       </p:pic>
       <p:pic>
         <p:nvPicPr>
-          <p:cNvPr id="6" name="slide2" descr="Sheet 1">
-            <a:extLst>
-              <a:ext uri="{FF2B5EF4-FFF2-40B4-BE49-F238E27FC236}">
-                <a16:creationId xmlns:a16="http://schemas.microsoft.com/office/drawing/2014/main" id="{5DA3A458-47BD-BDA4-BF1B-8DCC85CD0574}"/>
+          <p:cNvPr id="7" name="Picture 6" descr="Chart, bar chart&#10;&#10;Description automatically generated">
+            <a:extLst>
+              <a:ext uri="{FF2B5EF4-FFF2-40B4-BE49-F238E27FC236}">
+                <a16:creationId xmlns:a16="http://schemas.microsoft.com/office/drawing/2014/main" id="{77A844D3-CC2D-C8B1-005B-7C5176D5F3EF}"/>
               </a:ext>
             </a:extLst>
           </p:cNvPr>
@@ -5052,8 +5054,8 @@
         </p:blipFill>
         <p:spPr>
           <a:xfrm>
-            <a:off x="117985" y="4278243"/>
-            <a:ext cx="11945471" cy="1798092"/>
+            <a:off x="442076" y="4257666"/>
+            <a:ext cx="11307848" cy="2309244"/>
           </a:xfrm>
           <a:prstGeom prst="rect">
             <a:avLst/>
@@ -5063,7 +5065,7 @@
     </p:spTree>
     <p:extLst>
       <p:ext uri="{BB962C8B-B14F-4D97-AF65-F5344CB8AC3E}">
-        <p14:creationId xmlns:p14="http://schemas.microsoft.com/office/powerpoint/2010/main" val="2764512363"/>
+        <p14:creationId xmlns:p14="http://schemas.microsoft.com/office/powerpoint/2010/main" val="2811898665"/>
       </p:ext>
     </p:extLst>
   </p:cSld>
@@ -5182,7 +5184,7 @@
         </p:spPr>
         <p:txBody>
           <a:bodyPr vert="horz" lIns="91440" tIns="45720" rIns="91440" bIns="45720" rtlCol="0" anchor="b">
-            <a:normAutofit/>
+            <a:normAutofit fontScale="90000"/>
           </a:bodyPr>
           <a:lstStyle/>
           <a:p>
@@ -5197,7 +5199,45 @@
               </a:rPr>
               <a:t>Police Report Data</a:t>
             </a:r>
-            <a:endParaRPr lang="en-US" dirty="0">
+            <a:br>
+              <a:rPr lang="en-US" sz="5400" dirty="0">
+                <a:solidFill>
+                  <a:schemeClr val="bg1"/>
+                </a:solidFill>
+                <a:ea typeface="+mj-ea"/>
+                <a:cs typeface="+mj-cs"/>
+              </a:rPr>
+            </a:br>
+            <a:r>
+              <a:rPr lang="en-US" sz="1300" dirty="0">
+                <a:solidFill>
+                  <a:schemeClr val="bg1"/>
+                </a:solidFill>
+                <a:ea typeface="+mj-ea"/>
+                <a:cs typeface="+mj-cs"/>
+              </a:rPr>
+              <a:t>Red dots indicate an incident that occurred between 7pm-6am</a:t>
+            </a:r>
+            <a:br>
+              <a:rPr lang="en-US" sz="1300">
+                <a:solidFill>
+                  <a:schemeClr val="bg1"/>
+                </a:solidFill>
+                <a:ea typeface="+mj-ea"/>
+                <a:cs typeface="+mj-cs"/>
+              </a:rPr>
+            </a:br>
+            <a:r>
+              <a:rPr lang="en-US" sz="1300">
+                <a:solidFill>
+                  <a:schemeClr val="bg1"/>
+                </a:solidFill>
+                <a:ea typeface="+mj-ea"/>
+                <a:cs typeface="+mj-cs"/>
+              </a:rPr>
+              <a:t>Green dots indicate an incident that occurred between 7am-6pm</a:t>
+            </a:r>
+            <a:endParaRPr lang="en-US" sz="1300" dirty="0">
               <a:solidFill>
                 <a:schemeClr val="bg1"/>
               </a:solidFill>
@@ -5209,10 +5249,10 @@
       </p:sp>
       <p:pic>
         <p:nvPicPr>
-          <p:cNvPr id="4" name="Picture 3" descr="Chart, bar chart&#10;&#10;Description automatically generated">
-            <a:extLst>
-              <a:ext uri="{FF2B5EF4-FFF2-40B4-BE49-F238E27FC236}">
-                <a16:creationId xmlns:a16="http://schemas.microsoft.com/office/drawing/2014/main" id="{07B7D3F5-86C2-F66A-399D-6C7D6EB5E461}"/>
+          <p:cNvPr id="5" name="Picture 4" descr="A picture containing diagram&#10;&#10;Description automatically generated">
+            <a:extLst>
+              <a:ext uri="{FF2B5EF4-FFF2-40B4-BE49-F238E27FC236}">
+                <a16:creationId xmlns:a16="http://schemas.microsoft.com/office/drawing/2014/main" id="{FE050EC9-7207-816A-F829-C80B0B53E45F}"/>
               </a:ext>
             </a:extLst>
           </p:cNvPr>
@@ -5235,44 +5275,8 @@
         </p:blipFill>
         <p:spPr>
           <a:xfrm>
-            <a:off x="87314" y="1915064"/>
-            <a:ext cx="11841479" cy="1915064"/>
-          </a:xfrm>
-          <a:prstGeom prst="rect">
-            <a:avLst/>
-          </a:prstGeom>
-        </p:spPr>
-      </p:pic>
-      <p:pic>
-        <p:nvPicPr>
-          <p:cNvPr id="7" name="Picture 6" descr="Chart, bar chart&#10;&#10;Description automatically generated">
-            <a:extLst>
-              <a:ext uri="{FF2B5EF4-FFF2-40B4-BE49-F238E27FC236}">
-                <a16:creationId xmlns:a16="http://schemas.microsoft.com/office/drawing/2014/main" id="{77A844D3-CC2D-C8B1-005B-7C5176D5F3EF}"/>
-              </a:ext>
-            </a:extLst>
-          </p:cNvPr>
-          <p:cNvPicPr>
-            <a:picLocks noChangeAspect="1"/>
-          </p:cNvPicPr>
-          <p:nvPr/>
-        </p:nvPicPr>
-        <p:blipFill>
-          <a:blip r:embed="rId3">
-            <a:extLst>
-              <a:ext uri="{28A0092B-C50C-407E-A947-70E740481C1C}">
-                <a14:useLocalDpi xmlns:a14="http://schemas.microsoft.com/office/drawing/2010/main" val="0"/>
-              </a:ext>
-            </a:extLst>
-          </a:blip>
-          <a:stretch>
-            <a:fillRect/>
-          </a:stretch>
-        </p:blipFill>
-        <p:spPr>
-          <a:xfrm>
-            <a:off x="442076" y="4257666"/>
-            <a:ext cx="11307848" cy="2309244"/>
+            <a:off x="2025445" y="2142831"/>
+            <a:ext cx="7734545" cy="4173951"/>
           </a:xfrm>
           <a:prstGeom prst="rect">
             <a:avLst/>
@@ -5282,7 +5286,7 @@
     </p:spTree>
     <p:extLst>
       <p:ext uri="{BB962C8B-B14F-4D97-AF65-F5344CB8AC3E}">
-        <p14:creationId xmlns:p14="http://schemas.microsoft.com/office/powerpoint/2010/main" val="2811898665"/>
+        <p14:creationId xmlns:p14="http://schemas.microsoft.com/office/powerpoint/2010/main" val="1527527432"/>
       </p:ext>
     </p:extLst>
   </p:cSld>

</xml_diff>